<commit_message>
doc(./presentation): fixed mistypes. added pdf version of presentation
</commit_message>
<xml_diff>
--- a/presentation4.pptx
+++ b/presentation4.pptx
@@ -345,7 +345,7 @@
             <a:fld id="{5586B75A-687E-405C-8A0B-8D00578BA2C3}" type="datetimeFigureOut">
               <a:rPr lang="en-US" dirty="0"/>
               <a:pPr/>
-              <a:t>11/30/2021</a:t>
+              <a:t>12/5/2021</a:t>
             </a:fld>
             <a:endParaRPr lang="en-US" dirty="0"/>
           </a:p>
@@ -512,7 +512,7 @@
             <a:fld id="{5586B75A-687E-405C-8A0B-8D00578BA2C3}" type="datetimeFigureOut">
               <a:rPr lang="en-US" dirty="0"/>
               <a:pPr/>
-              <a:t>11/30/2021</a:t>
+              <a:t>12/5/2021</a:t>
             </a:fld>
             <a:endParaRPr lang="en-US" dirty="0"/>
           </a:p>
@@ -689,7 +689,7 @@
             <a:fld id="{5586B75A-687E-405C-8A0B-8D00578BA2C3}" type="datetimeFigureOut">
               <a:rPr lang="en-US" dirty="0"/>
               <a:pPr/>
-              <a:t>11/30/2021</a:t>
+              <a:t>12/5/2021</a:t>
             </a:fld>
             <a:endParaRPr lang="en-US" dirty="0"/>
           </a:p>
@@ -856,7 +856,7 @@
             <a:fld id="{5586B75A-687E-405C-8A0B-8D00578BA2C3}" type="datetimeFigureOut">
               <a:rPr lang="en-US" dirty="0"/>
               <a:pPr/>
-              <a:t>11/30/2021</a:t>
+              <a:t>12/5/2021</a:t>
             </a:fld>
             <a:endParaRPr lang="en-US" dirty="0"/>
           </a:p>
@@ -1111,7 +1111,7 @@
             <a:fld id="{5586B75A-687E-405C-8A0B-8D00578BA2C3}" type="datetimeFigureOut">
               <a:rPr lang="en-US" dirty="0"/>
               <a:pPr/>
-              <a:t>11/30/2021</a:t>
+              <a:t>12/5/2021</a:t>
             </a:fld>
             <a:endParaRPr lang="en-US" dirty="0"/>
           </a:p>
@@ -1396,7 +1396,7 @@
             <a:fld id="{5586B75A-687E-405C-8A0B-8D00578BA2C3}" type="datetimeFigureOut">
               <a:rPr lang="en-US" dirty="0"/>
               <a:pPr/>
-              <a:t>11/30/2021</a:t>
+              <a:t>12/5/2021</a:t>
             </a:fld>
             <a:endParaRPr lang="en-US" dirty="0"/>
           </a:p>
@@ -1835,7 +1835,7 @@
             <a:fld id="{5586B75A-687E-405C-8A0B-8D00578BA2C3}" type="datetimeFigureOut">
               <a:rPr lang="en-US" dirty="0"/>
               <a:pPr/>
-              <a:t>11/30/2021</a:t>
+              <a:t>12/5/2021</a:t>
             </a:fld>
             <a:endParaRPr lang="en-US" dirty="0"/>
           </a:p>
@@ -1950,7 +1950,7 @@
             <a:fld id="{5586B75A-687E-405C-8A0B-8D00578BA2C3}" type="datetimeFigureOut">
               <a:rPr lang="en-US" dirty="0"/>
               <a:pPr/>
-              <a:t>11/30/2021</a:t>
+              <a:t>12/5/2021</a:t>
             </a:fld>
             <a:endParaRPr lang="en-US" dirty="0"/>
           </a:p>
@@ -2042,7 +2042,7 @@
             <a:fld id="{5586B75A-687E-405C-8A0B-8D00578BA2C3}" type="datetimeFigureOut">
               <a:rPr lang="en-US" dirty="0"/>
               <a:pPr/>
-              <a:t>11/30/2021</a:t>
+              <a:t>12/5/2021</a:t>
             </a:fld>
             <a:endParaRPr lang="en-US" dirty="0"/>
           </a:p>
@@ -2327,7 +2327,7 @@
             <a:fld id="{5586B75A-687E-405C-8A0B-8D00578BA2C3}" type="datetimeFigureOut">
               <a:rPr lang="en-US" dirty="0"/>
               <a:pPr/>
-              <a:t>11/30/2021</a:t>
+              <a:t>12/5/2021</a:t>
             </a:fld>
             <a:endParaRPr lang="en-US" dirty="0"/>
           </a:p>
@@ -2598,7 +2598,7 @@
             <a:fld id="{5586B75A-687E-405C-8A0B-8D00578BA2C3}" type="datetimeFigureOut">
               <a:rPr lang="en-US" dirty="0"/>
               <a:pPr/>
-              <a:t>11/30/2021</a:t>
+              <a:t>12/5/2021</a:t>
             </a:fld>
             <a:endParaRPr lang="en-US" dirty="0"/>
           </a:p>
@@ -2894,7 +2894,7 @@
             <a:fld id="{5586B75A-687E-405C-8A0B-8D00578BA2C3}" type="datetimeFigureOut">
               <a:rPr lang="en-US" dirty="0"/>
               <a:pPr/>
-              <a:t>11/30/2021</a:t>
+              <a:t>12/5/2021</a:t>
             </a:fld>
             <a:endParaRPr lang="en-US" dirty="0"/>
           </a:p>
@@ -3519,21 +3519,7 @@
                 <a:latin typeface="Times New Roman" panose="02020603050405020304" pitchFamily="18" charset="0"/>
                 <a:cs typeface="Times New Roman" panose="02020603050405020304" pitchFamily="18" charset="0"/>
               </a:rPr>
-              <a:t>Проверил: </a:t>
-            </a:r>
-            <a:r>
-              <a:rPr lang="ru-RU" sz="2400" dirty="0" err="1">
-                <a:latin typeface="Times New Roman" panose="02020603050405020304" pitchFamily="18" charset="0"/>
-                <a:cs typeface="Times New Roman" panose="02020603050405020304" pitchFamily="18" charset="0"/>
-              </a:rPr>
-              <a:t>Лапытова</a:t>
-            </a:r>
-            <a:r>
-              <a:rPr lang="ru-RU" sz="2400" dirty="0">
-                <a:latin typeface="Times New Roman" panose="02020603050405020304" pitchFamily="18" charset="0"/>
-                <a:cs typeface="Times New Roman" panose="02020603050405020304" pitchFamily="18" charset="0"/>
-              </a:rPr>
-              <a:t> О. А.</a:t>
+              <a:t>Проверил: Латыпова О. А.</a:t>
             </a:r>
           </a:p>
         </p:txBody>

</xml_diff>